<commit_message>
Update slides to refer to the repository
</commit_message>
<xml_diff>
--- a/rust/session 01/RUSTikales Rust for beginners 01.pptx
+++ b/rust/session 01/RUSTikales Rust for beginners 01.pptx
@@ -23411,18 +23411,36 @@
               <a:buChar char="-"/>
             </a:pPr>
             <a:r>
-              <a:rPr lang="de">
+              <a:rPr lang="de" u="sng">
                 <a:solidFill>
-                  <a:srgbClr val="FF0000"/>
+                  <a:schemeClr val="hlink"/>
                 </a:solidFill>
+                <a:hlinkClick r:id="rId6"/>
               </a:rPr>
-              <a:t>TODO: Set up repo :^)</a:t>
-            </a:r>
-            <a:endParaRPr>
-              <a:solidFill>
-                <a:srgbClr val="FF0000"/>
-              </a:solidFill>
-            </a:endParaRPr>
+              <a:t>https://github.com/pfhaupt/progkurs/</a:t>
+            </a:r>
+            <a:r>
+              <a:rPr lang="de"/>
+              <a:t> </a:t>
+            </a:r>
+            <a:endParaRPr/>
+          </a:p>
+          <a:p>
+            <a:pPr indent="-298450" lvl="1" marL="914400" rtl="0" algn="l">
+              <a:spcBef>
+                <a:spcPts val="0"/>
+              </a:spcBef>
+              <a:spcAft>
+                <a:spcPts val="0"/>
+              </a:spcAft>
+              <a:buSzPts val="1100"/>
+              <a:buChar char="-"/>
+            </a:pPr>
+            <a:r>
+              <a:rPr lang="de"/>
+              <a:t>subdirectory `rust-beginner`</a:t>
+            </a:r>
+            <a:endParaRPr/>
           </a:p>
         </p:txBody>
       </p:sp>
@@ -31570,7 +31588,15 @@
             </a:pPr>
             <a:r>
               <a:rPr lang="de"/>
-              <a:t>→ Has been a long time since I was a beginner, so I may sometimes underestimate the difficulty of p</a:t>
+              <a:t>→ Has been a long time since I was a beginner, so I may sometimes underestimate the difficult</a:t>
+            </a:r>
+            <a:r>
+              <a:rPr lang="de"/>
+              <a:t>y</a:t>
+            </a:r>
+            <a:r>
+              <a:rPr lang="de"/>
+              <a:t> of p</a:t>
             </a:r>
             <a:r>
               <a:rPr lang="de"/>

</xml_diff>